<commit_message>
unable to index file
</commit_message>
<xml_diff>
--- a/research/presentation_simulation results.pptx
+++ b/research/presentation_simulation results.pptx
@@ -136,6 +136,9 @@
         </p14:section>
       </p14:sectionLst>
     </p:ext>
+    <p:ext uri="{EFAFB233-063F-42B5-8137-9DF3F51BA10A}">
+      <p15:sldGuideLst xmlns:p15="http://schemas.microsoft.com/office/powerpoint/2012/main"/>
+    </p:ext>
   </p:extLst>
 </p:presentation>
 </file>
@@ -287,7 +290,7 @@
           <a:p>
             <a:fld id="{1731E430-AE15-4FF2-8D8B-FFE6B7377A16}" type="datetimeFigureOut">
               <a:rPr lang="de-DE" smtClean="0"/>
-              <a:t>02.01.2024</a:t>
+              <a:t>03.01.2024</a:t>
             </a:fld>
             <a:endParaRPr lang="de-DE"/>
           </a:p>
@@ -485,7 +488,7 @@
           <a:p>
             <a:fld id="{1731E430-AE15-4FF2-8D8B-FFE6B7377A16}" type="datetimeFigureOut">
               <a:rPr lang="de-DE" smtClean="0"/>
-              <a:t>02.01.2024</a:t>
+              <a:t>03.01.2024</a:t>
             </a:fld>
             <a:endParaRPr lang="de-DE"/>
           </a:p>
@@ -693,7 +696,7 @@
           <a:p>
             <a:fld id="{1731E430-AE15-4FF2-8D8B-FFE6B7377A16}" type="datetimeFigureOut">
               <a:rPr lang="de-DE" smtClean="0"/>
-              <a:t>02.01.2024</a:t>
+              <a:t>03.01.2024</a:t>
             </a:fld>
             <a:endParaRPr lang="de-DE"/>
           </a:p>
@@ -891,7 +894,7 @@
           <a:p>
             <a:fld id="{1731E430-AE15-4FF2-8D8B-FFE6B7377A16}" type="datetimeFigureOut">
               <a:rPr lang="de-DE" smtClean="0"/>
-              <a:t>02.01.2024</a:t>
+              <a:t>03.01.2024</a:t>
             </a:fld>
             <a:endParaRPr lang="de-DE"/>
           </a:p>
@@ -1166,7 +1169,7 @@
           <a:p>
             <a:fld id="{1731E430-AE15-4FF2-8D8B-FFE6B7377A16}" type="datetimeFigureOut">
               <a:rPr lang="de-DE" smtClean="0"/>
-              <a:t>02.01.2024</a:t>
+              <a:t>03.01.2024</a:t>
             </a:fld>
             <a:endParaRPr lang="de-DE"/>
           </a:p>
@@ -1431,7 +1434,7 @@
           <a:p>
             <a:fld id="{1731E430-AE15-4FF2-8D8B-FFE6B7377A16}" type="datetimeFigureOut">
               <a:rPr lang="de-DE" smtClean="0"/>
-              <a:t>02.01.2024</a:t>
+              <a:t>03.01.2024</a:t>
             </a:fld>
             <a:endParaRPr lang="de-DE"/>
           </a:p>
@@ -1843,7 +1846,7 @@
           <a:p>
             <a:fld id="{1731E430-AE15-4FF2-8D8B-FFE6B7377A16}" type="datetimeFigureOut">
               <a:rPr lang="de-DE" smtClean="0"/>
-              <a:t>02.01.2024</a:t>
+              <a:t>03.01.2024</a:t>
             </a:fld>
             <a:endParaRPr lang="de-DE"/>
           </a:p>
@@ -1984,7 +1987,7 @@
           <a:p>
             <a:fld id="{1731E430-AE15-4FF2-8D8B-FFE6B7377A16}" type="datetimeFigureOut">
               <a:rPr lang="de-DE" smtClean="0"/>
-              <a:t>02.01.2024</a:t>
+              <a:t>03.01.2024</a:t>
             </a:fld>
             <a:endParaRPr lang="de-DE"/>
           </a:p>
@@ -2097,7 +2100,7 @@
           <a:p>
             <a:fld id="{1731E430-AE15-4FF2-8D8B-FFE6B7377A16}" type="datetimeFigureOut">
               <a:rPr lang="de-DE" smtClean="0"/>
-              <a:t>02.01.2024</a:t>
+              <a:t>03.01.2024</a:t>
             </a:fld>
             <a:endParaRPr lang="de-DE"/>
           </a:p>
@@ -2408,7 +2411,7 @@
           <a:p>
             <a:fld id="{1731E430-AE15-4FF2-8D8B-FFE6B7377A16}" type="datetimeFigureOut">
               <a:rPr lang="de-DE" smtClean="0"/>
-              <a:t>02.01.2024</a:t>
+              <a:t>03.01.2024</a:t>
             </a:fld>
             <a:endParaRPr lang="de-DE"/>
           </a:p>
@@ -2696,7 +2699,7 @@
           <a:p>
             <a:fld id="{1731E430-AE15-4FF2-8D8B-FFE6B7377A16}" type="datetimeFigureOut">
               <a:rPr lang="de-DE" smtClean="0"/>
-              <a:t>02.01.2024</a:t>
+              <a:t>03.01.2024</a:t>
             </a:fld>
             <a:endParaRPr lang="de-DE"/>
           </a:p>
@@ -2937,7 +2940,7 @@
           <a:p>
             <a:fld id="{1731E430-AE15-4FF2-8D8B-FFE6B7377A16}" type="datetimeFigureOut">
               <a:rPr lang="de-DE" smtClean="0"/>
-              <a:t>02.01.2024</a:t>
+              <a:t>03.01.2024</a:t>
             </a:fld>
             <a:endParaRPr lang="de-DE"/>
           </a:p>
@@ -3719,8 +3722,8 @@
           </a:p>
         </p:txBody>
       </p:sp>
-      <mc:AlternateContent xmlns:mc="http://schemas.openxmlformats.org/markup-compatibility/2006">
-        <mc:Choice xmlns:a14="http://schemas.microsoft.com/office/drawing/2010/main" Requires="a14">
+      <mc:AlternateContent xmlns:mc="http://schemas.openxmlformats.org/markup-compatibility/2006" xmlns:a14="http://schemas.microsoft.com/office/drawing/2010/main">
+        <mc:Choice Requires="a14">
           <p:sp>
             <p:nvSpPr>
               <p:cNvPr id="3" name="Inhaltsplatzhalter 2">
@@ -4241,7 +4244,7 @@
             </p:txBody>
           </p:sp>
         </mc:Choice>
-        <mc:Fallback>
+        <mc:Fallback xmlns="">
           <p:sp>
             <p:nvSpPr>
               <p:cNvPr id="3" name="Inhaltsplatzhalter 2">
@@ -4474,10 +4477,10 @@
       </p:sp>
       <p:pic>
         <p:nvPicPr>
-          <p:cNvPr id="4" name="Inhaltsplatzhalter 16" descr="Ein Bild, das Text, Diagramm, Reihe, Schrift enthält.&#10;&#10;Automatisch generierte Beschreibung">
-            <a:extLst>
-              <a:ext uri="{FF2B5EF4-FFF2-40B4-BE49-F238E27FC236}">
-                <a16:creationId xmlns:a16="http://schemas.microsoft.com/office/drawing/2014/main" id="{B597B6B0-041F-5631-AD9D-E9B8E558B2AC}"/>
+          <p:cNvPr id="11" name="Inhaltsplatzhalter 10" descr="Ein Bild, das Text, Schrift, Reihe, Diagramm enthält.&#10;&#10;Automatisch generierte Beschreibung">
+            <a:extLst>
+              <a:ext uri="{FF2B5EF4-FFF2-40B4-BE49-F238E27FC236}">
+                <a16:creationId xmlns:a16="http://schemas.microsoft.com/office/drawing/2014/main" id="{2CA092A6-1777-1206-B7BC-2BC415488A79}"/>
               </a:ext>
             </a:extLst>
           </p:cNvPr>
@@ -4655,10 +4658,10 @@
       </p:sp>
       <p:pic>
         <p:nvPicPr>
-          <p:cNvPr id="14" name="Grafik 13" descr="Ein Bild, das Reihe, Diagramm, Origami enthält.&#10;&#10;Automatisch generierte Beschreibung">
-            <a:extLst>
-              <a:ext uri="{FF2B5EF4-FFF2-40B4-BE49-F238E27FC236}">
-                <a16:creationId xmlns:a16="http://schemas.microsoft.com/office/drawing/2014/main" id="{990A6D21-7E89-FF5A-862A-954870FAAE3D}"/>
+          <p:cNvPr id="4" name="Grafik 3" descr="Ein Bild, das Diagramm, Reihe enthält.&#10;&#10;Automatisch generierte Beschreibung">
+            <a:extLst>
+              <a:ext uri="{FF2B5EF4-FFF2-40B4-BE49-F238E27FC236}">
+                <a16:creationId xmlns:a16="http://schemas.microsoft.com/office/drawing/2014/main" id="{78CA275B-DB8C-9CB6-B4E7-FE8314437BDB}"/>
               </a:ext>
             </a:extLst>
           </p:cNvPr>

</xml_diff>

<commit_message>
teil a und b und praesi fertig
</commit_message>
<xml_diff>
--- a/research/presentation_simulation results.pptx
+++ b/research/presentation_simulation results.pptx
@@ -12,8 +12,10 @@
     <p:sldId id="263" r:id="rId6"/>
     <p:sldId id="260" r:id="rId7"/>
     <p:sldId id="264" r:id="rId8"/>
-    <p:sldId id="261" r:id="rId9"/>
-    <p:sldId id="262" r:id="rId10"/>
+    <p:sldId id="265" r:id="rId9"/>
+    <p:sldId id="261" r:id="rId10"/>
+    <p:sldId id="262" r:id="rId11"/>
+    <p:sldId id="266" r:id="rId12"/>
   </p:sldIdLst>
   <p:sldSz cx="12192000" cy="6858000"/>
   <p:notesSz cx="6858000" cy="9144000"/>
@@ -132,8 +134,10 @@
         </p14:section>
         <p14:section name="Teil b)" id="{CD250EFA-90FA-4C57-97A4-BFD7E68D9492}">
           <p14:sldIdLst>
+            <p14:sldId id="265"/>
             <p14:sldId id="261"/>
             <p14:sldId id="262"/>
+            <p14:sldId id="266"/>
           </p14:sldIdLst>
         </p14:section>
       </p14:sectionLst>
@@ -292,7 +296,7 @@
           <a:p>
             <a:fld id="{1731E430-AE15-4FF2-8D8B-FFE6B7377A16}" type="datetimeFigureOut">
               <a:rPr lang="de-DE" smtClean="0"/>
-              <a:t>05.01.2024</a:t>
+              <a:t>07.01.2024</a:t>
             </a:fld>
             <a:endParaRPr lang="de-DE"/>
           </a:p>
@@ -490,7 +494,7 @@
           <a:p>
             <a:fld id="{1731E430-AE15-4FF2-8D8B-FFE6B7377A16}" type="datetimeFigureOut">
               <a:rPr lang="de-DE" smtClean="0"/>
-              <a:t>05.01.2024</a:t>
+              <a:t>07.01.2024</a:t>
             </a:fld>
             <a:endParaRPr lang="de-DE"/>
           </a:p>
@@ -698,7 +702,7 @@
           <a:p>
             <a:fld id="{1731E430-AE15-4FF2-8D8B-FFE6B7377A16}" type="datetimeFigureOut">
               <a:rPr lang="de-DE" smtClean="0"/>
-              <a:t>05.01.2024</a:t>
+              <a:t>07.01.2024</a:t>
             </a:fld>
             <a:endParaRPr lang="de-DE"/>
           </a:p>
@@ -896,7 +900,7 @@
           <a:p>
             <a:fld id="{1731E430-AE15-4FF2-8D8B-FFE6B7377A16}" type="datetimeFigureOut">
               <a:rPr lang="de-DE" smtClean="0"/>
-              <a:t>05.01.2024</a:t>
+              <a:t>07.01.2024</a:t>
             </a:fld>
             <a:endParaRPr lang="de-DE"/>
           </a:p>
@@ -1171,7 +1175,7 @@
           <a:p>
             <a:fld id="{1731E430-AE15-4FF2-8D8B-FFE6B7377A16}" type="datetimeFigureOut">
               <a:rPr lang="de-DE" smtClean="0"/>
-              <a:t>05.01.2024</a:t>
+              <a:t>07.01.2024</a:t>
             </a:fld>
             <a:endParaRPr lang="de-DE"/>
           </a:p>
@@ -1436,7 +1440,7 @@
           <a:p>
             <a:fld id="{1731E430-AE15-4FF2-8D8B-FFE6B7377A16}" type="datetimeFigureOut">
               <a:rPr lang="de-DE" smtClean="0"/>
-              <a:t>05.01.2024</a:t>
+              <a:t>07.01.2024</a:t>
             </a:fld>
             <a:endParaRPr lang="de-DE"/>
           </a:p>
@@ -1848,7 +1852,7 @@
           <a:p>
             <a:fld id="{1731E430-AE15-4FF2-8D8B-FFE6B7377A16}" type="datetimeFigureOut">
               <a:rPr lang="de-DE" smtClean="0"/>
-              <a:t>05.01.2024</a:t>
+              <a:t>07.01.2024</a:t>
             </a:fld>
             <a:endParaRPr lang="de-DE"/>
           </a:p>
@@ -1989,7 +1993,7 @@
           <a:p>
             <a:fld id="{1731E430-AE15-4FF2-8D8B-FFE6B7377A16}" type="datetimeFigureOut">
               <a:rPr lang="de-DE" smtClean="0"/>
-              <a:t>05.01.2024</a:t>
+              <a:t>07.01.2024</a:t>
             </a:fld>
             <a:endParaRPr lang="de-DE"/>
           </a:p>
@@ -2102,7 +2106,7 @@
           <a:p>
             <a:fld id="{1731E430-AE15-4FF2-8D8B-FFE6B7377A16}" type="datetimeFigureOut">
               <a:rPr lang="de-DE" smtClean="0"/>
-              <a:t>05.01.2024</a:t>
+              <a:t>07.01.2024</a:t>
             </a:fld>
             <a:endParaRPr lang="de-DE"/>
           </a:p>
@@ -2413,7 +2417,7 @@
           <a:p>
             <a:fld id="{1731E430-AE15-4FF2-8D8B-FFE6B7377A16}" type="datetimeFigureOut">
               <a:rPr lang="de-DE" smtClean="0"/>
-              <a:t>05.01.2024</a:t>
+              <a:t>07.01.2024</a:t>
             </a:fld>
             <a:endParaRPr lang="de-DE"/>
           </a:p>
@@ -2701,7 +2705,7 @@
           <a:p>
             <a:fld id="{1731E430-AE15-4FF2-8D8B-FFE6B7377A16}" type="datetimeFigureOut">
               <a:rPr lang="de-DE" smtClean="0"/>
-              <a:t>05.01.2024</a:t>
+              <a:t>07.01.2024</a:t>
             </a:fld>
             <a:endParaRPr lang="de-DE"/>
           </a:p>
@@ -2778,9 +2782,15 @@
 <p:sldMaster xmlns:a="http://schemas.openxmlformats.org/drawingml/2006/main" xmlns:r="http://schemas.openxmlformats.org/officeDocument/2006/relationships" xmlns:p="http://schemas.openxmlformats.org/presentationml/2006/main">
   <p:cSld>
     <p:bg>
-      <p:bgRef idx="1001">
-        <a:schemeClr val="bg1"/>
-      </p:bgRef>
+      <p:bgPr>
+        <a:solidFill>
+          <a:schemeClr val="accent1">
+            <a:lumMod val="20000"/>
+            <a:lumOff val="80000"/>
+          </a:schemeClr>
+        </a:solidFill>
+        <a:effectLst/>
+      </p:bgPr>
     </p:bg>
     <p:spTree>
       <p:nvGrpSpPr>
@@ -2942,7 +2952,7 @@
           <a:p>
             <a:fld id="{1731E430-AE15-4FF2-8D8B-FFE6B7377A16}" type="datetimeFigureOut">
               <a:rPr lang="de-DE" smtClean="0"/>
-              <a:t>05.01.2024</a:t>
+              <a:t>07.01.2024</a:t>
             </a:fld>
             <a:endParaRPr lang="de-DE"/>
           </a:p>
@@ -3396,7 +3406,7 @@
               </a:rPr>
             </a:br>
             <a:r>
-              <a:rPr lang="de-DE" dirty="0">
+              <a:rPr lang="de-DE" i="1" dirty="0">
                 <a:latin typeface="Helvetica" panose="020B0604020202020204" pitchFamily="34" charset="0"/>
                 <a:cs typeface="Helvetica" panose="020B0604020202020204" pitchFamily="34" charset="0"/>
               </a:rPr>
@@ -3458,6 +3468,204 @@
     <p:extLst>
       <p:ext uri="{BB962C8B-B14F-4D97-AF65-F5344CB8AC3E}">
         <p14:creationId xmlns:p14="http://schemas.microsoft.com/office/powerpoint/2010/main" val="3922597093"/>
+      </p:ext>
+    </p:extLst>
+  </p:cSld>
+  <p:clrMapOvr>
+    <a:masterClrMapping/>
+  </p:clrMapOvr>
+</p:sld>
+</file>
+
+<file path=ppt/slides/slide10.xml><?xml version="1.0" encoding="utf-8"?>
+<p:sld xmlns:a="http://schemas.openxmlformats.org/drawingml/2006/main" xmlns:r="http://schemas.openxmlformats.org/officeDocument/2006/relationships" xmlns:p="http://schemas.openxmlformats.org/presentationml/2006/main">
+  <p:cSld>
+    <p:spTree>
+      <p:nvGrpSpPr>
+        <p:cNvPr id="1" name=""/>
+        <p:cNvGrpSpPr/>
+        <p:nvPr/>
+      </p:nvGrpSpPr>
+      <p:grpSpPr>
+        <a:xfrm>
+          <a:off x="0" y="0"/>
+          <a:ext cx="0" cy="0"/>
+          <a:chOff x="0" y="0"/>
+          <a:chExt cx="0" cy="0"/>
+        </a:xfrm>
+      </p:grpSpPr>
+      <p:sp>
+        <p:nvSpPr>
+          <p:cNvPr id="2" name="Titel 1">
+            <a:extLst>
+              <a:ext uri="{FF2B5EF4-FFF2-40B4-BE49-F238E27FC236}">
+                <a16:creationId xmlns:a16="http://schemas.microsoft.com/office/drawing/2014/main" id="{D3ABCADF-2A44-7EFF-29E7-B7F310451A7E}"/>
+              </a:ext>
+            </a:extLst>
+          </p:cNvPr>
+          <p:cNvSpPr>
+            <a:spLocks noGrp="1"/>
+          </p:cNvSpPr>
+          <p:nvPr>
+            <p:ph type="title"/>
+          </p:nvPr>
+        </p:nvSpPr>
+        <p:spPr/>
+        <p:txBody>
+          <a:bodyPr>
+            <a:normAutofit fontScale="90000"/>
+          </a:bodyPr>
+          <a:lstStyle/>
+          <a:p>
+            <a:pPr lvl="1"/>
+            <a:r>
+              <a:rPr lang="de-DE" sz="4400" dirty="0">
+                <a:latin typeface="Helvetica" panose="020B0604020202020204" pitchFamily="34" charset="0"/>
+                <a:cs typeface="Helvetica" panose="020B0604020202020204" pitchFamily="34" charset="0"/>
+              </a:rPr>
+              <a:t>Simulationsergebnisse Netzfreundliche Einspeisung POD (I)</a:t>
+            </a:r>
+          </a:p>
+        </p:txBody>
+      </p:sp>
+      <p:pic>
+        <p:nvPicPr>
+          <p:cNvPr id="4" name="Inhaltsplatzhalter 3" descr="Ein Bild, das Text, Diagramm, Zahl, Reihe enthält.&#10;&#10;Automatisch generierte Beschreibung">
+            <a:extLst>
+              <a:ext uri="{FF2B5EF4-FFF2-40B4-BE49-F238E27FC236}">
+                <a16:creationId xmlns:a16="http://schemas.microsoft.com/office/drawing/2014/main" id="{E9B41A65-B442-AEF1-AB19-D19E27BD5657}"/>
+              </a:ext>
+            </a:extLst>
+          </p:cNvPr>
+          <p:cNvPicPr>
+            <a:picLocks noGrp="1" noChangeAspect="1"/>
+          </p:cNvPicPr>
+          <p:nvPr>
+            <p:ph idx="1"/>
+          </p:nvPr>
+        </p:nvPicPr>
+        <p:blipFill>
+          <a:blip r:embed="rId2">
+            <a:extLst>
+              <a:ext uri="{28A0092B-C50C-407E-A947-70E740481C1C}">
+                <a14:useLocalDpi xmlns:a14="http://schemas.microsoft.com/office/drawing/2010/main" val="0"/>
+              </a:ext>
+            </a:extLst>
+          </a:blip>
+          <a:stretch>
+            <a:fillRect/>
+          </a:stretch>
+        </p:blipFill>
+        <p:spPr>
+          <a:xfrm>
+            <a:off x="1746650" y="1825625"/>
+            <a:ext cx="8698699" cy="4351338"/>
+          </a:xfrm>
+        </p:spPr>
+      </p:pic>
+    </p:spTree>
+    <p:extLst>
+      <p:ext uri="{BB962C8B-B14F-4D97-AF65-F5344CB8AC3E}">
+        <p14:creationId xmlns:p14="http://schemas.microsoft.com/office/powerpoint/2010/main" val="1641018152"/>
+      </p:ext>
+    </p:extLst>
+  </p:cSld>
+  <p:clrMapOvr>
+    <a:masterClrMapping/>
+  </p:clrMapOvr>
+</p:sld>
+</file>
+
+<file path=ppt/slides/slide11.xml><?xml version="1.0" encoding="utf-8"?>
+<p:sld xmlns:a="http://schemas.openxmlformats.org/drawingml/2006/main" xmlns:r="http://schemas.openxmlformats.org/officeDocument/2006/relationships" xmlns:p="http://schemas.openxmlformats.org/presentationml/2006/main">
+  <p:cSld>
+    <p:spTree>
+      <p:nvGrpSpPr>
+        <p:cNvPr id="1" name=""/>
+        <p:cNvGrpSpPr/>
+        <p:nvPr/>
+      </p:nvGrpSpPr>
+      <p:grpSpPr>
+        <a:xfrm>
+          <a:off x="0" y="0"/>
+          <a:ext cx="0" cy="0"/>
+          <a:chOff x="0" y="0"/>
+          <a:chExt cx="0" cy="0"/>
+        </a:xfrm>
+      </p:grpSpPr>
+      <p:sp>
+        <p:nvSpPr>
+          <p:cNvPr id="2" name="Titel 1">
+            <a:extLst>
+              <a:ext uri="{FF2B5EF4-FFF2-40B4-BE49-F238E27FC236}">
+                <a16:creationId xmlns:a16="http://schemas.microsoft.com/office/drawing/2014/main" id="{D3ABCADF-2A44-7EFF-29E7-B7F310451A7E}"/>
+              </a:ext>
+            </a:extLst>
+          </p:cNvPr>
+          <p:cNvSpPr>
+            <a:spLocks noGrp="1"/>
+          </p:cNvSpPr>
+          <p:nvPr>
+            <p:ph type="title"/>
+          </p:nvPr>
+        </p:nvSpPr>
+        <p:spPr/>
+        <p:txBody>
+          <a:bodyPr>
+            <a:normAutofit fontScale="90000"/>
+          </a:bodyPr>
+          <a:lstStyle/>
+          <a:p>
+            <a:pPr lvl="1"/>
+            <a:r>
+              <a:rPr lang="de-DE" sz="4400" dirty="0">
+                <a:latin typeface="Helvetica" panose="020B0604020202020204" pitchFamily="34" charset="0"/>
+                <a:cs typeface="Helvetica" panose="020B0604020202020204" pitchFamily="34" charset="0"/>
+              </a:rPr>
+              <a:t>Simulationsergebnisse Netzfreundliche Einspeisung POD (II)</a:t>
+            </a:r>
+          </a:p>
+        </p:txBody>
+      </p:sp>
+      <p:pic>
+        <p:nvPicPr>
+          <p:cNvPr id="11" name="Inhaltsplatzhalter 10" descr="Ein Bild, das Reihe, Diagramm, Electric Blue (Farbe) enthält.&#10;&#10;Automatisch generierte Beschreibung">
+            <a:extLst>
+              <a:ext uri="{FF2B5EF4-FFF2-40B4-BE49-F238E27FC236}">
+                <a16:creationId xmlns:a16="http://schemas.microsoft.com/office/drawing/2014/main" id="{48CE36B6-86C5-B6C4-2C69-3BE4D94651AD}"/>
+              </a:ext>
+            </a:extLst>
+          </p:cNvPr>
+          <p:cNvPicPr>
+            <a:picLocks noGrp="1" noChangeAspect="1"/>
+          </p:cNvPicPr>
+          <p:nvPr>
+            <p:ph idx="1"/>
+          </p:nvPr>
+        </p:nvPicPr>
+        <p:blipFill>
+          <a:blip r:embed="rId2">
+            <a:extLst>
+              <a:ext uri="{28A0092B-C50C-407E-A947-70E740481C1C}">
+                <a14:useLocalDpi xmlns:a14="http://schemas.microsoft.com/office/drawing/2010/main" val="0"/>
+              </a:ext>
+            </a:extLst>
+          </a:blip>
+          <a:stretch>
+            <a:fillRect/>
+          </a:stretch>
+        </p:blipFill>
+        <p:spPr>
+          <a:xfrm>
+            <a:off x="1746650" y="1825625"/>
+            <a:ext cx="8698699" cy="4351338"/>
+          </a:xfrm>
+        </p:spPr>
+      </p:pic>
+    </p:spTree>
+    <p:extLst>
+      <p:ext uri="{BB962C8B-B14F-4D97-AF65-F5344CB8AC3E}">
+        <p14:creationId xmlns:p14="http://schemas.microsoft.com/office/powerpoint/2010/main" val="2948856863"/>
       </p:ext>
     </p:extLst>
   </p:cSld>
@@ -4479,10 +4687,10 @@
       </p:sp>
       <p:pic>
         <p:nvPicPr>
-          <p:cNvPr id="6" name="Inhaltsplatzhalter 5" descr="Ein Bild, das Text, Diagramm, Reihe, Schrift enthält.&#10;&#10;Automatisch generierte Beschreibung">
-            <a:extLst>
-              <a:ext uri="{FF2B5EF4-FFF2-40B4-BE49-F238E27FC236}">
-                <a16:creationId xmlns:a16="http://schemas.microsoft.com/office/drawing/2014/main" id="{D0B8F0F9-30D6-DB20-44AD-3F78CF13C92C}"/>
+          <p:cNvPr id="7" name="Inhaltsplatzhalter 6" descr="Ein Bild, das Text, Reihe, Diagramm, Schrift enthält.&#10;&#10;Automatisch generierte Beschreibung">
+            <a:extLst>
+              <a:ext uri="{FF2B5EF4-FFF2-40B4-BE49-F238E27FC236}">
+                <a16:creationId xmlns:a16="http://schemas.microsoft.com/office/drawing/2014/main" id="{D266761D-6E51-B727-9D9F-9A037E6868B3}"/>
               </a:ext>
             </a:extLst>
           </p:cNvPr>
@@ -4507,8 +4715,8 @@
         </p:blipFill>
         <p:spPr>
           <a:xfrm>
-            <a:off x="931049" y="1690688"/>
-            <a:ext cx="10329901" cy="5167312"/>
+            <a:off x="1746650" y="1825625"/>
+            <a:ext cx="8698699" cy="4351338"/>
           </a:xfrm>
         </p:spPr>
       </p:pic>
@@ -4788,10 +4996,10 @@
       </p:sp>
       <p:pic>
         <p:nvPicPr>
-          <p:cNvPr id="5" name="Inhaltsplatzhalter 4" descr="Ein Bild, das Text, Diagramm, Reihe, Schrift enthält.&#10;&#10;Automatisch generierte Beschreibung">
-            <a:extLst>
-              <a:ext uri="{FF2B5EF4-FFF2-40B4-BE49-F238E27FC236}">
-                <a16:creationId xmlns:a16="http://schemas.microsoft.com/office/drawing/2014/main" id="{AD7AC584-FC9A-8162-88BD-1A2C77F3722B}"/>
+          <p:cNvPr id="7" name="Inhaltsplatzhalter 6" descr="Ein Bild, das Text, Reihe, Diagramm, Schrift enthält.&#10;&#10;Automatisch generierte Beschreibung">
+            <a:extLst>
+              <a:ext uri="{FF2B5EF4-FFF2-40B4-BE49-F238E27FC236}">
+                <a16:creationId xmlns:a16="http://schemas.microsoft.com/office/drawing/2014/main" id="{865D443F-39E8-E328-5B97-005B89AD1333}"/>
               </a:ext>
             </a:extLst>
           </p:cNvPr>
@@ -4816,8 +5024,8 @@
         </p:blipFill>
         <p:spPr>
           <a:xfrm>
-            <a:off x="931049" y="1690688"/>
-            <a:ext cx="10329901" cy="5167312"/>
+            <a:off x="1746650" y="1825625"/>
+            <a:ext cx="8698699" cy="4351338"/>
           </a:xfrm>
         </p:spPr>
       </p:pic>
@@ -5062,48 +5270,50 @@
                 <a:latin typeface="Helvetica" panose="020B0604020202020204" pitchFamily="34" charset="0"/>
                 <a:cs typeface="Helvetica" panose="020B0604020202020204" pitchFamily="34" charset="0"/>
               </a:rPr>
-              <a:t>Simulationsergebnisse Netzfreundliche Einspeisung PD</a:t>
-            </a:r>
-          </a:p>
-        </p:txBody>
-      </p:sp>
-      <p:sp>
-        <p:nvSpPr>
-          <p:cNvPr id="3" name="Inhaltsplatzhalter 2">
-            <a:extLst>
-              <a:ext uri="{FF2B5EF4-FFF2-40B4-BE49-F238E27FC236}">
-                <a16:creationId xmlns:a16="http://schemas.microsoft.com/office/drawing/2014/main" id="{D33AB9D4-73DF-F7B8-3ED2-E2ED9687048F}"/>
-              </a:ext>
-            </a:extLst>
-          </p:cNvPr>
-          <p:cNvSpPr>
-            <a:spLocks noGrp="1"/>
-          </p:cNvSpPr>
+              <a:t>Simulationsergebnisse Netzfreundliche Einspeisung PD (I)</a:t>
+            </a:r>
+          </a:p>
+        </p:txBody>
+      </p:sp>
+      <p:pic>
+        <p:nvPicPr>
+          <p:cNvPr id="6" name="Inhaltsplatzhalter 5" descr="Ein Bild, das Text, Diagramm, Zahl, Reihe enthält.&#10;&#10;Automatisch generierte Beschreibung">
+            <a:extLst>
+              <a:ext uri="{FF2B5EF4-FFF2-40B4-BE49-F238E27FC236}">
+                <a16:creationId xmlns:a16="http://schemas.microsoft.com/office/drawing/2014/main" id="{7527B218-3823-1355-964E-587942A9B3EC}"/>
+              </a:ext>
+            </a:extLst>
+          </p:cNvPr>
+          <p:cNvPicPr>
+            <a:picLocks noGrp="1" noChangeAspect="1"/>
+          </p:cNvPicPr>
           <p:nvPr>
             <p:ph idx="1"/>
           </p:nvPr>
-        </p:nvSpPr>
-        <p:spPr/>
-        <p:txBody>
-          <a:bodyPr>
-            <a:normAutofit/>
-          </a:bodyPr>
-          <a:lstStyle/>
-          <a:p>
-            <a:r>
-              <a:rPr lang="de-DE" sz="2000" dirty="0">
-                <a:latin typeface="Helvetica" panose="020B0604020202020204" pitchFamily="34" charset="0"/>
-                <a:cs typeface="Helvetica" panose="020B0604020202020204" pitchFamily="34" charset="0"/>
-              </a:rPr>
-              <a:t>AS</a:t>
-            </a:r>
-          </a:p>
-        </p:txBody>
-      </p:sp>
+        </p:nvPicPr>
+        <p:blipFill>
+          <a:blip r:embed="rId2">
+            <a:extLst>
+              <a:ext uri="{28A0092B-C50C-407E-A947-70E740481C1C}">
+                <a14:useLocalDpi xmlns:a14="http://schemas.microsoft.com/office/drawing/2010/main" val="0"/>
+              </a:ext>
+            </a:extLst>
+          </a:blip>
+          <a:stretch>
+            <a:fillRect/>
+          </a:stretch>
+        </p:blipFill>
+        <p:spPr>
+          <a:xfrm>
+            <a:off x="1746650" y="1825625"/>
+            <a:ext cx="8698699" cy="4351338"/>
+          </a:xfrm>
+        </p:spPr>
+      </p:pic>
     </p:spTree>
     <p:extLst>
       <p:ext uri="{BB962C8B-B14F-4D97-AF65-F5344CB8AC3E}">
-        <p14:creationId xmlns:p14="http://schemas.microsoft.com/office/powerpoint/2010/main" val="2652903933"/>
+        <p14:creationId xmlns:p14="http://schemas.microsoft.com/office/powerpoint/2010/main" val="160435167"/>
       </p:ext>
     </p:extLst>
   </p:cSld>
@@ -5159,40 +5369,50 @@
                 <a:latin typeface="Helvetica" panose="020B0604020202020204" pitchFamily="34" charset="0"/>
                 <a:cs typeface="Helvetica" panose="020B0604020202020204" pitchFamily="34" charset="0"/>
               </a:rPr>
-              <a:t>Simulationsergebnisse Netzfreundliche Einspeisung POD</a:t>
-            </a:r>
-          </a:p>
-        </p:txBody>
-      </p:sp>
-      <p:sp>
-        <p:nvSpPr>
-          <p:cNvPr id="19" name="Inhaltsplatzhalter 18">
-            <a:extLst>
-              <a:ext uri="{FF2B5EF4-FFF2-40B4-BE49-F238E27FC236}">
-                <a16:creationId xmlns:a16="http://schemas.microsoft.com/office/drawing/2014/main" id="{CEACD679-5E71-8FE2-9812-1CEC7FF10B97}"/>
-              </a:ext>
-            </a:extLst>
-          </p:cNvPr>
-          <p:cNvSpPr>
-            <a:spLocks noGrp="1"/>
-          </p:cNvSpPr>
+              <a:t>Simulationsergebnisse Netzfreundliche Einspeisung PD (II)</a:t>
+            </a:r>
+          </a:p>
+        </p:txBody>
+      </p:sp>
+      <p:pic>
+        <p:nvPicPr>
+          <p:cNvPr id="11" name="Inhaltsplatzhalter 10" descr="Ein Bild, das Reihe, Text, Diagramm, Schrift enthält.&#10;&#10;Automatisch generierte Beschreibung">
+            <a:extLst>
+              <a:ext uri="{FF2B5EF4-FFF2-40B4-BE49-F238E27FC236}">
+                <a16:creationId xmlns:a16="http://schemas.microsoft.com/office/drawing/2014/main" id="{905B0A6C-F4AE-9E98-6F89-1C36853FEF78}"/>
+              </a:ext>
+            </a:extLst>
+          </p:cNvPr>
+          <p:cNvPicPr>
+            <a:picLocks noGrp="1" noChangeAspect="1"/>
+          </p:cNvPicPr>
           <p:nvPr>
             <p:ph idx="1"/>
           </p:nvPr>
-        </p:nvSpPr>
-        <p:spPr/>
-        <p:txBody>
-          <a:bodyPr/>
-          <a:lstStyle/>
-          <a:p>
-            <a:endParaRPr lang="de-DE"/>
-          </a:p>
-        </p:txBody>
-      </p:sp>
+        </p:nvPicPr>
+        <p:blipFill>
+          <a:blip r:embed="rId2">
+            <a:extLst>
+              <a:ext uri="{28A0092B-C50C-407E-A947-70E740481C1C}">
+                <a14:useLocalDpi xmlns:a14="http://schemas.microsoft.com/office/drawing/2010/main" val="0"/>
+              </a:ext>
+            </a:extLst>
+          </a:blip>
+          <a:stretch>
+            <a:fillRect/>
+          </a:stretch>
+        </p:blipFill>
+        <p:spPr>
+          <a:xfrm>
+            <a:off x="1746650" y="1825625"/>
+            <a:ext cx="8698699" cy="4351338"/>
+          </a:xfrm>
+        </p:spPr>
+      </p:pic>
     </p:spTree>
     <p:extLst>
       <p:ext uri="{BB962C8B-B14F-4D97-AF65-F5344CB8AC3E}">
-        <p14:creationId xmlns:p14="http://schemas.microsoft.com/office/powerpoint/2010/main" val="1641018152"/>
+        <p14:creationId xmlns:p14="http://schemas.microsoft.com/office/powerpoint/2010/main" val="2652903933"/>
       </p:ext>
     </p:extLst>
   </p:cSld>

</xml_diff>